<commit_message>
deep questions / presentations
</commit_message>
<xml_diff>
--- a/lectures/DeepQuestions.pptx
+++ b/lectures/DeepQuestions.pptx
@@ -5,13 +5,13 @@
     <p:sldMasterId id="2147483660" r:id="rId1"/>
   </p:sldMasterIdLst>
   <p:handoutMasterIdLst>
-    <p:handoutMasterId r:id="rId15"/>
+    <p:handoutMasterId r:id="rId16"/>
   </p:handoutMasterIdLst>
   <p:sldIdLst>
     <p:sldId id="256" r:id="rId2"/>
-    <p:sldId id="257" r:id="rId3"/>
-    <p:sldId id="268" r:id="rId4"/>
-    <p:sldId id="258" r:id="rId5"/>
+    <p:sldId id="268" r:id="rId3"/>
+    <p:sldId id="258" r:id="rId4"/>
+    <p:sldId id="269" r:id="rId5"/>
     <p:sldId id="259" r:id="rId6"/>
     <p:sldId id="260" r:id="rId7"/>
     <p:sldId id="261" r:id="rId8"/>
@@ -21,6 +21,7 @@
     <p:sldId id="265" r:id="rId12"/>
     <p:sldId id="266" r:id="rId13"/>
     <p:sldId id="267" r:id="rId14"/>
+    <p:sldId id="270" r:id="rId15"/>
   </p:sldIdLst>
   <p:sldSz cx="9144000" cy="6858000" type="screen4x3"/>
   <p:notesSz cx="6858000" cy="9144000"/>
@@ -234,7 +235,7 @@
           <a:p>
             <a:fld id="{08BD4FA9-F3CE-45B3-A980-C331C6F1EF65}" type="datetimeFigureOut">
               <a:rPr lang="en-US" smtClean="0"/>
-              <a:t>2/25/2024</a:t>
+              <a:t>2/21/2025</a:t>
             </a:fld>
             <a:endParaRPr lang="en-US"/>
           </a:p>
@@ -507,7 +508,7 @@
           <a:p>
             <a:fld id="{EAAD3657-2200-4D14-82C0-10C39B0F0F06}" type="datetime1">
               <a:rPr lang="en-US" smtClean="0"/>
-              <a:t>2/25/2024</a:t>
+              <a:t>2/21/2025</a:t>
             </a:fld>
             <a:endParaRPr lang="en-US"/>
           </a:p>
@@ -675,7 +676,7 @@
           <a:p>
             <a:fld id="{11BBAF55-A85E-4993-914E-FC1E5AA7DF24}" type="datetime1">
               <a:rPr lang="en-US" smtClean="0"/>
-              <a:t>2/25/2024</a:t>
+              <a:t>2/21/2025</a:t>
             </a:fld>
             <a:endParaRPr lang="en-US"/>
           </a:p>
@@ -853,7 +854,7 @@
           <a:p>
             <a:fld id="{39816E07-E1DB-44A4-A5E5-9F4B54E8C933}" type="datetime1">
               <a:rPr lang="en-US" smtClean="0"/>
-              <a:t>2/25/2024</a:t>
+              <a:t>2/21/2025</a:t>
             </a:fld>
             <a:endParaRPr lang="en-US"/>
           </a:p>
@@ -1038,7 +1039,7 @@
           <a:p>
             <a:fld id="{C2B1AD17-B813-4477-8AFE-B1860CC59113}" type="datetime1">
               <a:rPr lang="en-US" smtClean="0"/>
-              <a:t>2/25/2024</a:t>
+              <a:t>2/21/2025</a:t>
             </a:fld>
             <a:endParaRPr lang="en-US"/>
           </a:p>
@@ -1283,7 +1284,7 @@
           <a:p>
             <a:fld id="{D0975C0D-5C9E-48CC-8D31-F42D19FA8F7A}" type="datetime1">
               <a:rPr lang="en-US" smtClean="0"/>
-              <a:t>2/25/2024</a:t>
+              <a:t>2/21/2025</a:t>
             </a:fld>
             <a:endParaRPr lang="en-US"/>
           </a:p>
@@ -1568,7 +1569,7 @@
           <a:p>
             <a:fld id="{28657551-0F2B-4F09-86FD-F7994CE83DC5}" type="datetime1">
               <a:rPr lang="en-US" smtClean="0"/>
-              <a:t>2/25/2024</a:t>
+              <a:t>2/21/2025</a:t>
             </a:fld>
             <a:endParaRPr lang="en-US"/>
           </a:p>
@@ -1987,7 +1988,7 @@
           <a:p>
             <a:fld id="{3929D2B2-4200-46B9-96C3-02A55D5FAA00}" type="datetime1">
               <a:rPr lang="en-US" smtClean="0"/>
-              <a:t>2/25/2024</a:t>
+              <a:t>2/21/2025</a:t>
             </a:fld>
             <a:endParaRPr lang="en-US"/>
           </a:p>
@@ -2104,7 +2105,7 @@
           <a:p>
             <a:fld id="{41FF7722-74E8-497F-A072-89677A2C2373}" type="datetime1">
               <a:rPr lang="en-US" smtClean="0"/>
-              <a:t>2/25/2024</a:t>
+              <a:t>2/21/2025</a:t>
             </a:fld>
             <a:endParaRPr lang="en-US"/>
           </a:p>
@@ -2199,7 +2200,7 @@
           <a:p>
             <a:fld id="{BD26212E-B46B-426F-AE59-AA326827D9E0}" type="datetime1">
               <a:rPr lang="en-US" smtClean="0"/>
-              <a:t>2/25/2024</a:t>
+              <a:t>2/21/2025</a:t>
             </a:fld>
             <a:endParaRPr lang="en-US"/>
           </a:p>
@@ -2474,7 +2475,7 @@
           <a:p>
             <a:fld id="{FB9B81E8-09EA-4684-A39F-38DE1E49D20C}" type="datetime1">
               <a:rPr lang="en-US" smtClean="0"/>
-              <a:t>2/25/2024</a:t>
+              <a:t>2/21/2025</a:t>
             </a:fld>
             <a:endParaRPr lang="en-US"/>
           </a:p>
@@ -2726,7 +2727,7 @@
           <a:p>
             <a:fld id="{35C5CC5F-056C-4047-9A5C-9F5B4BED129B}" type="datetime1">
               <a:rPr lang="en-US" smtClean="0"/>
-              <a:t>2/25/2024</a:t>
+              <a:t>2/21/2025</a:t>
             </a:fld>
             <a:endParaRPr lang="en-US"/>
           </a:p>
@@ -2940,7 +2941,7 @@
           <a:p>
             <a:fld id="{E8171053-07BD-4A17-AC24-0A22EAA36098}" type="datetime1">
               <a:rPr lang="en-US" smtClean="0"/>
-              <a:t>2/25/2024</a:t>
+              <a:t>2/21/2025</a:t>
             </a:fld>
             <a:endParaRPr lang="en-US"/>
           </a:p>
@@ -4158,7 +4159,7 @@
             </a:r>
             <a:r>
               <a:rPr lang="en-US" sz="2400" dirty="0"/>
-              <a:t> here was given the February 2019 </a:t>
+              <a:t> here was given the February 2024 </a:t>
             </a:r>
             <a:r>
               <a:rPr lang="en-US" sz="2400" i="1" dirty="0"/>
@@ -4228,6 +4229,42 @@
           </a:p>
         </p:txBody>
       </p:sp>
+      <p:pic>
+        <p:nvPicPr>
+          <p:cNvPr id="7" name="Picture 6" descr="A logo of a beer bottle&#10;&#10;AI-generated content may be incorrect.">
+            <a:extLst>
+              <a:ext uri="{FF2B5EF4-FFF2-40B4-BE49-F238E27FC236}">
+                <a16:creationId xmlns:a16="http://schemas.microsoft.com/office/drawing/2014/main" id="{42916385-F193-87D5-3613-DA514C46AE96}"/>
+              </a:ext>
+            </a:extLst>
+          </p:cNvPr>
+          <p:cNvPicPr>
+            <a:picLocks noChangeAspect="1"/>
+          </p:cNvPicPr>
+          <p:nvPr/>
+        </p:nvPicPr>
+        <p:blipFill>
+          <a:blip r:embed="rId3" cstate="print">
+            <a:extLst>
+              <a:ext uri="{28A0092B-C50C-407E-A947-70E740481C1C}">
+                <a14:useLocalDpi xmlns:a14="http://schemas.microsoft.com/office/drawing/2010/main" val="0"/>
+              </a:ext>
+            </a:extLst>
+          </a:blip>
+          <a:stretch>
+            <a:fillRect/>
+          </a:stretch>
+        </p:blipFill>
+        <p:spPr>
+          <a:xfrm>
+            <a:off x="5802796" y="3139264"/>
+            <a:ext cx="1805608" cy="2072932"/>
+          </a:xfrm>
+          <a:prstGeom prst="rect">
+            <a:avLst/>
+          </a:prstGeom>
+        </p:spPr>
+      </p:pic>
     </p:spTree>
     <p:extLst>
       <p:ext uri="{BB962C8B-B14F-4D97-AF65-F5344CB8AC3E}">
@@ -4341,51 +4378,6 @@
             </a:r>
           </a:p>
           <a:p>
-            <a:r>
-              <a:rPr lang="en-US" dirty="0"/>
-              <a:t>Extend this to another species: </a:t>
-            </a:r>
-          </a:p>
-          <a:p>
-            <a:pPr lvl="1"/>
-            <a:r>
-              <a:rPr lang="en-US" dirty="0"/>
-              <a:t>dolphins: known to be much smarter than sharks and turtles; is graphical preference related to intelligence?</a:t>
-            </a:r>
-          </a:p>
-          <a:p>
-            <a:pPr lvl="1"/>
-            <a:r>
-              <a:rPr lang="en-US" dirty="0"/>
-              <a:t>parrot fish, groupers, lobsters: what can we do??</a:t>
-            </a:r>
-          </a:p>
-          <a:p>
-            <a:r>
-              <a:rPr lang="en-US" dirty="0"/>
-              <a:t>Investigate influence of </a:t>
-            </a:r>
-            <a:r>
-              <a:rPr lang="en-US" dirty="0">
-                <a:solidFill>
-                  <a:srgbClr val="FF0000"/>
-                </a:solidFill>
-              </a:rPr>
-              <a:t>color</a:t>
-            </a:r>
-            <a:r>
-              <a:rPr lang="en-US" dirty="0"/>
-              <a:t> on graph preference</a:t>
-            </a:r>
-          </a:p>
-          <a:p>
-            <a:pPr lvl="1"/>
-            <a:r>
-              <a:rPr lang="en-US" dirty="0"/>
-              <a:t>This can be also be studied as a function of depth, because colors  become more muted at greater depth</a:t>
-            </a:r>
-          </a:p>
-          <a:p>
             <a:pPr marL="0" indent="0">
               <a:buNone/>
             </a:pPr>
@@ -4429,12 +4421,18 @@
 </p:sld>
 </file>
 
-<file path=ppt/slides/slide2.xml><?xml version="1.0" encoding="utf-8"?>
-<p:sld xmlns:a="http://schemas.openxmlformats.org/drawingml/2006/main" xmlns:r="http://schemas.openxmlformats.org/officeDocument/2006/relationships" xmlns:p="http://schemas.openxmlformats.org/presentationml/2006/main" show="0">
+<file path=ppt/slides/slide14.xml><?xml version="1.0" encoding="utf-8"?>
+<p:sld xmlns:a="http://schemas.openxmlformats.org/drawingml/2006/main" xmlns:r="http://schemas.openxmlformats.org/officeDocument/2006/relationships" xmlns:p="http://schemas.openxmlformats.org/presentationml/2006/main">
   <p:cSld>
     <p:spTree>
       <p:nvGrpSpPr>
-        <p:cNvPr id="1" name=""/>
+        <p:cNvPr id="1" name="">
+          <a:extLst>
+            <a:ext uri="{FF2B5EF4-FFF2-40B4-BE49-F238E27FC236}">
+              <a16:creationId xmlns:a16="http://schemas.microsoft.com/office/drawing/2014/main" id="{1AAE07D9-D784-57BF-8914-4E309F95F9CB}"/>
+            </a:ext>
+          </a:extLst>
+        </p:cNvPr>
         <p:cNvGrpSpPr/>
         <p:nvPr/>
       </p:nvGrpSpPr>
@@ -4448,7 +4446,116 @@
       </p:grpSpPr>
       <p:sp>
         <p:nvSpPr>
-          <p:cNvPr id="2" name="Slide Number Placeholder 1"/>
+          <p:cNvPr id="2" name="Title 1">
+            <a:extLst>
+              <a:ext uri="{FF2B5EF4-FFF2-40B4-BE49-F238E27FC236}">
+                <a16:creationId xmlns:a16="http://schemas.microsoft.com/office/drawing/2014/main" id="{A1BDEE22-89E8-8C30-C8C3-9449433D11AB}"/>
+              </a:ext>
+            </a:extLst>
+          </p:cNvPr>
+          <p:cNvSpPr>
+            <a:spLocks noGrp="1"/>
+          </p:cNvSpPr>
+          <p:nvPr>
+            <p:ph type="title"/>
+          </p:nvPr>
+        </p:nvSpPr>
+        <p:spPr/>
+        <p:txBody>
+          <a:bodyPr>
+            <a:normAutofit fontScale="90000"/>
+          </a:bodyPr>
+          <a:lstStyle/>
+          <a:p>
+            <a:r>
+              <a:rPr lang="en-US" dirty="0"/>
+              <a:t>Further research</a:t>
+            </a:r>
+          </a:p>
+        </p:txBody>
+      </p:sp>
+      <p:sp>
+        <p:nvSpPr>
+          <p:cNvPr id="3" name="Content Placeholder 2">
+            <a:extLst>
+              <a:ext uri="{FF2B5EF4-FFF2-40B4-BE49-F238E27FC236}">
+                <a16:creationId xmlns:a16="http://schemas.microsoft.com/office/drawing/2014/main" id="{9FCFC25D-6EE9-2E5A-3A65-1BF133C14DA7}"/>
+              </a:ext>
+            </a:extLst>
+          </p:cNvPr>
+          <p:cNvSpPr>
+            <a:spLocks noGrp="1"/>
+          </p:cNvSpPr>
+          <p:nvPr>
+            <p:ph idx="1"/>
+          </p:nvPr>
+        </p:nvSpPr>
+        <p:spPr/>
+        <p:txBody>
+          <a:bodyPr/>
+          <a:lstStyle/>
+          <a:p>
+            <a:r>
+              <a:rPr lang="en-US" dirty="0"/>
+              <a:t>Extend this to another species: </a:t>
+            </a:r>
+          </a:p>
+          <a:p>
+            <a:pPr lvl="1"/>
+            <a:r>
+              <a:rPr lang="en-US" dirty="0"/>
+              <a:t>dolphins: known to be much smarter than sharks and turtles; is graphical preference related to intelligence?</a:t>
+            </a:r>
+          </a:p>
+          <a:p>
+            <a:pPr lvl="1"/>
+            <a:r>
+              <a:rPr lang="en-US" dirty="0"/>
+              <a:t>parrot fish, groupers, lobsters: what can we do??</a:t>
+            </a:r>
+          </a:p>
+          <a:p>
+            <a:r>
+              <a:rPr lang="en-US" dirty="0"/>
+              <a:t>Investigate influence of </a:t>
+            </a:r>
+            <a:r>
+              <a:rPr lang="en-US" dirty="0">
+                <a:solidFill>
+                  <a:srgbClr val="FF0000"/>
+                </a:solidFill>
+              </a:rPr>
+              <a:t>color</a:t>
+            </a:r>
+            <a:r>
+              <a:rPr lang="en-US" dirty="0"/>
+              <a:t> on graph preference</a:t>
+            </a:r>
+          </a:p>
+          <a:p>
+            <a:pPr lvl="1"/>
+            <a:r>
+              <a:rPr lang="en-US" dirty="0"/>
+              <a:t>This can be also be studied as a function of depth, because colors  become more muted at greater depth</a:t>
+            </a:r>
+          </a:p>
+          <a:p>
+            <a:pPr marL="0" indent="0">
+              <a:buNone/>
+            </a:pPr>
+            <a:endParaRPr lang="en-US" dirty="0"/>
+          </a:p>
+        </p:txBody>
+      </p:sp>
+      <p:sp>
+        <p:nvSpPr>
+          <p:cNvPr id="4" name="Slide Number Placeholder 3">
+            <a:extLst>
+              <a:ext uri="{FF2B5EF4-FFF2-40B4-BE49-F238E27FC236}">
+                <a16:creationId xmlns:a16="http://schemas.microsoft.com/office/drawing/2014/main" id="{A4B2908D-EF49-607F-4049-F60422E8EE6A}"/>
+              </a:ext>
+            </a:extLst>
+          </p:cNvPr>
           <p:cNvSpPr>
             <a:spLocks noGrp="1"/>
           </p:cNvSpPr>
@@ -4463,82 +4570,16 @@
           <a:p>
             <a:fld id="{621225AB-15B9-4C79-A121-04D1DC7E2307}" type="slidenum">
               <a:rPr lang="en-US" smtClean="0"/>
-              <a:t>2</a:t>
+              <a:t>14</a:t>
             </a:fld>
             <a:endParaRPr lang="en-US"/>
-          </a:p>
-        </p:txBody>
-      </p:sp>
-      <p:sp>
-        <p:nvSpPr>
-          <p:cNvPr id="3" name="TextBox 2"/>
-          <p:cNvSpPr txBox="1"/>
-          <p:nvPr/>
-        </p:nvSpPr>
-        <p:spPr>
-          <a:xfrm>
-            <a:off x="609600" y="914400"/>
-            <a:ext cx="7620000" cy="1569660"/>
-          </a:xfrm>
-          <a:prstGeom prst="rect">
-            <a:avLst/>
-          </a:prstGeom>
-          <a:noFill/>
-        </p:spPr>
-        <p:txBody>
-          <a:bodyPr wrap="square" rtlCol="0">
-            <a:spAutoFit/>
-          </a:bodyPr>
-          <a:lstStyle/>
-          <a:p>
-            <a:pPr algn="ctr"/>
-            <a:r>
-              <a:rPr lang="en-CA" sz="3200" dirty="0"/>
-              <a:t>While you were enjoying a relaxing week without classes, I was working hard, pondering the:</a:t>
-            </a:r>
-          </a:p>
-        </p:txBody>
-      </p:sp>
-      <p:sp>
-        <p:nvSpPr>
-          <p:cNvPr id="4" name="TextBox 3"/>
-          <p:cNvSpPr txBox="1"/>
-          <p:nvPr/>
-        </p:nvSpPr>
-        <p:spPr>
-          <a:xfrm>
-            <a:off x="838200" y="2971800"/>
-            <a:ext cx="7162800" cy="1754326"/>
-          </a:xfrm>
-          <a:prstGeom prst="rect">
-            <a:avLst/>
-          </a:prstGeom>
-          <a:solidFill>
-            <a:srgbClr val="002060"/>
-          </a:solidFill>
-        </p:spPr>
-        <p:txBody>
-          <a:bodyPr wrap="square" rtlCol="0">
-            <a:spAutoFit/>
-          </a:bodyPr>
-          <a:lstStyle/>
-          <a:p>
-            <a:pPr algn="ctr"/>
-            <a:r>
-              <a:rPr lang="en-CA" sz="5400" dirty="0">
-                <a:solidFill>
-                  <a:schemeClr val="bg1"/>
-                </a:solidFill>
-              </a:rPr>
-              <a:t>Deep Questions of Data Visualization</a:t>
-            </a:r>
           </a:p>
         </p:txBody>
       </p:sp>
     </p:spTree>
     <p:extLst>
       <p:ext uri="{BB962C8B-B14F-4D97-AF65-F5344CB8AC3E}">
-        <p14:creationId xmlns:p14="http://schemas.microsoft.com/office/powerpoint/2010/main" val="2570832178"/>
+        <p14:creationId xmlns:p14="http://schemas.microsoft.com/office/powerpoint/2010/main" val="3293261069"/>
       </p:ext>
     </p:extLst>
   </p:cSld>
@@ -4548,7 +4589,7 @@
 </p:sld>
 </file>
 
-<file path=ppt/slides/slide3.xml><?xml version="1.0" encoding="utf-8"?>
+<file path=ppt/slides/slide2.xml><?xml version="1.0" encoding="utf-8"?>
 <p:sld xmlns:a="http://schemas.openxmlformats.org/drawingml/2006/main" xmlns:r="http://schemas.openxmlformats.org/officeDocument/2006/relationships" xmlns:p="http://schemas.openxmlformats.org/presentationml/2006/main">
   <p:cSld>
     <p:spTree>
@@ -4588,7 +4629,7 @@
           <a:p>
             <a:fld id="{621225AB-15B9-4C79-A121-04D1DC7E2307}" type="slidenum">
               <a:rPr lang="en-US" smtClean="0"/>
-              <a:t>3</a:t>
+              <a:t>2</a:t>
             </a:fld>
             <a:endParaRPr lang="en-US"/>
           </a:p>
@@ -4733,7 +4774,7 @@
 </p:sld>
 </file>
 
-<file path=ppt/slides/slide4.xml><?xml version="1.0" encoding="utf-8"?>
+<file path=ppt/slides/slide3.xml><?xml version="1.0" encoding="utf-8"?>
 <p:sld xmlns:a="http://schemas.openxmlformats.org/drawingml/2006/main" xmlns:r="http://schemas.openxmlformats.org/officeDocument/2006/relationships" xmlns:p="http://schemas.openxmlformats.org/presentationml/2006/main">
   <p:cSld>
     <p:spTree>
@@ -4767,7 +4808,7 @@
           <a:p>
             <a:fld id="{621225AB-15B9-4C79-A121-04D1DC7E2307}" type="slidenum">
               <a:rPr lang="en-US" smtClean="0"/>
-              <a:t>4</a:t>
+              <a:t>3</a:t>
             </a:fld>
             <a:endParaRPr lang="en-US"/>
           </a:p>
@@ -4963,6 +5004,441 @@
     <p:extLst>
       <p:ext uri="{BB962C8B-B14F-4D97-AF65-F5344CB8AC3E}">
         <p14:creationId xmlns:p14="http://schemas.microsoft.com/office/powerpoint/2010/main" val="279807329"/>
+      </p:ext>
+    </p:extLst>
+  </p:cSld>
+  <p:clrMapOvr>
+    <a:masterClrMapping/>
+  </p:clrMapOvr>
+</p:sld>
+</file>
+
+<file path=ppt/slides/slide4.xml><?xml version="1.0" encoding="utf-8"?>
+<p:sld xmlns:a="http://schemas.openxmlformats.org/drawingml/2006/main" xmlns:r="http://schemas.openxmlformats.org/officeDocument/2006/relationships" xmlns:p="http://schemas.openxmlformats.org/presentationml/2006/main">
+  <p:cSld>
+    <p:bg>
+      <p:bgPr>
+        <a:solidFill>
+          <a:schemeClr val="bg1"/>
+        </a:solidFill>
+        <a:effectLst/>
+      </p:bgPr>
+    </p:bg>
+    <p:spTree>
+      <p:nvGrpSpPr>
+        <p:cNvPr id="1" name=""/>
+        <p:cNvGrpSpPr/>
+        <p:nvPr/>
+      </p:nvGrpSpPr>
+      <p:grpSpPr>
+        <a:xfrm>
+          <a:off x="0" y="0"/>
+          <a:ext cx="0" cy="0"/>
+          <a:chOff x="0" y="0"/>
+          <a:chExt cx="0" cy="0"/>
+        </a:xfrm>
+      </p:grpSpPr>
+      <p:sp>
+        <p:nvSpPr>
+          <p:cNvPr id="12" name="Rectangle 11">
+            <a:extLst>
+              <a:ext uri="{FF2B5EF4-FFF2-40B4-BE49-F238E27FC236}">
+                <a16:creationId xmlns:a16="http://schemas.microsoft.com/office/drawing/2014/main" id="{27BDFED6-6E33-4606-AFE2-886ADB1C018E}"/>
+              </a:ext>
+              <a:ext uri="{C183D7F6-B498-43B3-948B-1728B52AA6E4}">
+                <adec:decorative xmlns:adec="http://schemas.microsoft.com/office/drawing/2017/decorative" val="1"/>
+              </a:ext>
+            </a:extLst>
+          </p:cNvPr>
+          <p:cNvSpPr>
+            <a:spLocks noGrp="1" noRot="1" noChangeAspect="1" noMove="1" noResize="1" noEditPoints="1" noAdjustHandles="1" noChangeArrowheads="1" noChangeShapeType="1" noTextEdit="1"/>
+          </p:cNvSpPr>
+          <p:nvPr>
+            <p:extLst>
+              <p:ext uri="{386F3935-93C4-4BCD-93E2-E3B085C9AB24}">
+                <p16:designElem xmlns:p16="http://schemas.microsoft.com/office/powerpoint/2015/main" val="1"/>
+              </p:ext>
+            </p:extLst>
+          </p:nvPr>
+        </p:nvSpPr>
+        <p:spPr>
+          <a:xfrm>
+            <a:off x="0" y="0"/>
+            <a:ext cx="9144000" cy="6858000"/>
+          </a:xfrm>
+          <a:prstGeom prst="rect">
+            <a:avLst/>
+          </a:prstGeom>
+          <a:solidFill>
+            <a:schemeClr val="tx1">
+              <a:lumMod val="95000"/>
+              <a:lumOff val="5000"/>
+            </a:schemeClr>
+          </a:solidFill>
+          <a:ln>
+            <a:noFill/>
+          </a:ln>
+        </p:spPr>
+        <p:style>
+          <a:lnRef idx="2">
+            <a:schemeClr val="accent1">
+              <a:shade val="50000"/>
+            </a:schemeClr>
+          </a:lnRef>
+          <a:fillRef idx="1">
+            <a:schemeClr val="accent1"/>
+          </a:fillRef>
+          <a:effectRef idx="0">
+            <a:schemeClr val="accent1"/>
+          </a:effectRef>
+          <a:fontRef idx="minor">
+            <a:schemeClr val="lt1"/>
+          </a:fontRef>
+        </p:style>
+        <p:txBody>
+          <a:bodyPr rtlCol="0" anchor="ctr"/>
+          <a:lstStyle/>
+          <a:p>
+            <a:pPr algn="ctr"/>
+            <a:endParaRPr lang="en-US" dirty="0"/>
+          </a:p>
+        </p:txBody>
+      </p:sp>
+      <p:pic>
+        <p:nvPicPr>
+          <p:cNvPr id="6" name="Picture 5" descr="A map of a body of water&#10;&#10;AI-generated content may be incorrect.">
+            <a:extLst>
+              <a:ext uri="{FF2B5EF4-FFF2-40B4-BE49-F238E27FC236}">
+                <a16:creationId xmlns:a16="http://schemas.microsoft.com/office/drawing/2014/main" id="{A4CCB761-2E12-E34A-5E0B-14A2630685F0}"/>
+              </a:ext>
+            </a:extLst>
+          </p:cNvPr>
+          <p:cNvPicPr>
+            <a:picLocks noChangeAspect="1"/>
+          </p:cNvPicPr>
+          <p:nvPr/>
+        </p:nvPicPr>
+        <p:blipFill>
+          <a:blip r:embed="rId2">
+            <a:extLst>
+              <a:ext uri="{28A0092B-C50C-407E-A947-70E740481C1C}">
+                <a14:useLocalDpi xmlns:a14="http://schemas.microsoft.com/office/drawing/2010/main" val="0"/>
+              </a:ext>
+            </a:extLst>
+          </a:blip>
+          <a:srcRect t="2288" r="3" b="20220"/>
+          <a:stretch/>
+        </p:blipFill>
+        <p:spPr>
+          <a:xfrm>
+            <a:off x="995153" y="2171307"/>
+            <a:ext cx="8148846" cy="4515153"/>
+          </a:xfrm>
+          <a:prstGeom prst="rect">
+            <a:avLst/>
+          </a:prstGeom>
+        </p:spPr>
+      </p:pic>
+      <p:sp>
+        <p:nvSpPr>
+          <p:cNvPr id="14" name="Rectangle 13">
+            <a:extLst>
+              <a:ext uri="{FF2B5EF4-FFF2-40B4-BE49-F238E27FC236}">
+                <a16:creationId xmlns:a16="http://schemas.microsoft.com/office/drawing/2014/main" id="{890DEF05-784E-4B61-89E4-04C4ECF4E5A0}"/>
+              </a:ext>
+              <a:ext uri="{C183D7F6-B498-43B3-948B-1728B52AA6E4}">
+                <adec:decorative xmlns:adec="http://schemas.microsoft.com/office/drawing/2017/decorative" val="1"/>
+              </a:ext>
+            </a:extLst>
+          </p:cNvPr>
+          <p:cNvSpPr>
+            <a:spLocks noGrp="1" noRot="1" noChangeAspect="1" noMove="1" noResize="1" noEditPoints="1" noAdjustHandles="1" noChangeArrowheads="1" noChangeShapeType="1" noTextEdit="1"/>
+          </p:cNvSpPr>
+          <p:nvPr>
+            <p:extLst>
+              <p:ext uri="{386F3935-93C4-4BCD-93E2-E3B085C9AB24}">
+                <p16:designElem xmlns:p16="http://schemas.microsoft.com/office/powerpoint/2015/main" val="1"/>
+              </p:ext>
+            </p:extLst>
+          </p:nvPr>
+        </p:nvSpPr>
+        <p:spPr>
+          <a:xfrm>
+            <a:off x="0" y="0"/>
+            <a:ext cx="9144000" cy="6858000"/>
+          </a:xfrm>
+          <a:prstGeom prst="rect">
+            <a:avLst/>
+          </a:prstGeom>
+          <a:gradFill>
+            <a:gsLst>
+              <a:gs pos="36000">
+                <a:schemeClr val="tx1">
+                  <a:lumMod val="95000"/>
+                  <a:lumOff val="5000"/>
+                </a:schemeClr>
+              </a:gs>
+              <a:gs pos="81000">
+                <a:schemeClr val="tx1">
+                  <a:lumMod val="95000"/>
+                  <a:lumOff val="5000"/>
+                  <a:alpha val="0"/>
+                </a:schemeClr>
+              </a:gs>
+            </a:gsLst>
+            <a:lin ang="0" scaled="0"/>
+          </a:gradFill>
+          <a:ln>
+            <a:noFill/>
+          </a:ln>
+        </p:spPr>
+        <p:style>
+          <a:lnRef idx="2">
+            <a:schemeClr val="accent1">
+              <a:shade val="50000"/>
+            </a:schemeClr>
+          </a:lnRef>
+          <a:fillRef idx="1">
+            <a:schemeClr val="accent1"/>
+          </a:fillRef>
+          <a:effectRef idx="0">
+            <a:schemeClr val="accent1"/>
+          </a:effectRef>
+          <a:fontRef idx="minor">
+            <a:schemeClr val="lt1"/>
+          </a:fontRef>
+        </p:style>
+        <p:txBody>
+          <a:bodyPr rtlCol="0" anchor="ctr"/>
+          <a:lstStyle/>
+          <a:p>
+            <a:pPr algn="ctr"/>
+            <a:endParaRPr lang="en-US"/>
+          </a:p>
+        </p:txBody>
+      </p:sp>
+      <p:sp>
+        <p:nvSpPr>
+          <p:cNvPr id="7" name="TextBox 6">
+            <a:extLst>
+              <a:ext uri="{FF2B5EF4-FFF2-40B4-BE49-F238E27FC236}">
+                <a16:creationId xmlns:a16="http://schemas.microsoft.com/office/drawing/2014/main" id="{9A6DAFAF-3B94-8E43-1CB3-DF5504F9531F}"/>
+              </a:ext>
+            </a:extLst>
+          </p:cNvPr>
+          <p:cNvSpPr txBox="1"/>
+          <p:nvPr/>
+        </p:nvSpPr>
+        <p:spPr>
+          <a:xfrm>
+            <a:off x="229143" y="375038"/>
+            <a:ext cx="6457950" cy="1262857"/>
+          </a:xfrm>
+          <a:prstGeom prst="rect">
+            <a:avLst/>
+          </a:prstGeom>
+        </p:spPr>
+        <p:txBody>
+          <a:bodyPr vert="horz" lIns="91440" tIns="45720" rIns="91440" bIns="45720" rtlCol="0" anchor="b">
+            <a:normAutofit fontScale="92500"/>
+          </a:bodyPr>
+          <a:lstStyle/>
+          <a:p>
+            <a:pPr>
+              <a:lnSpc>
+                <a:spcPct val="90000"/>
+              </a:lnSpc>
+              <a:spcBef>
+                <a:spcPct val="0"/>
+              </a:spcBef>
+              <a:spcAft>
+                <a:spcPts val="600"/>
+              </a:spcAft>
+            </a:pPr>
+            <a:r>
+              <a:rPr lang="en-US" sz="3700" kern="1200" dirty="0">
+                <a:solidFill>
+                  <a:schemeClr val="bg1"/>
+                </a:solidFill>
+                <a:latin typeface="+mj-lt"/>
+                <a:ea typeface="+mj-ea"/>
+                <a:cs typeface="+mj-cs"/>
+              </a:rPr>
+              <a:t>Deep Questions Research Institute</a:t>
+            </a:r>
+          </a:p>
+          <a:p>
+            <a:pPr>
+              <a:lnSpc>
+                <a:spcPct val="90000"/>
+              </a:lnSpc>
+              <a:spcBef>
+                <a:spcPct val="0"/>
+              </a:spcBef>
+              <a:spcAft>
+                <a:spcPts val="600"/>
+              </a:spcAft>
+            </a:pPr>
+            <a:r>
+              <a:rPr lang="en-US" sz="3700" kern="1200" dirty="0">
+                <a:solidFill>
+                  <a:schemeClr val="bg1"/>
+                </a:solidFill>
+                <a:latin typeface="+mj-lt"/>
+                <a:ea typeface="+mj-ea"/>
+                <a:cs typeface="+mj-cs"/>
+              </a:rPr>
+              <a:t>Great Exuma, Bahamas</a:t>
+            </a:r>
+          </a:p>
+        </p:txBody>
+      </p:sp>
+      <p:cxnSp>
+        <p:nvCxnSpPr>
+          <p:cNvPr id="16" name="Straight Connector 15">
+            <a:extLst>
+              <a:ext uri="{FF2B5EF4-FFF2-40B4-BE49-F238E27FC236}">
+                <a16:creationId xmlns:a16="http://schemas.microsoft.com/office/drawing/2014/main" id="{C41BAEC7-F7B0-4224-8B18-8F74B7D87F0B}"/>
+              </a:ext>
+              <a:ext uri="{C183D7F6-B498-43B3-948B-1728B52AA6E4}">
+                <adec:decorative xmlns:adec="http://schemas.microsoft.com/office/drawing/2017/decorative" val="1"/>
+              </a:ext>
+            </a:extLst>
+          </p:cNvPr>
+          <p:cNvCxnSpPr>
+            <a:cxnSpLocks noGrp="1" noRot="1" noChangeAspect="1" noMove="1" noResize="1" noEditPoints="1" noAdjustHandles="1" noChangeArrowheads="1" noChangeShapeType="1"/>
+          </p:cNvCxnSpPr>
+          <p:nvPr>
+            <p:extLst>
+              <p:ext uri="{386F3935-93C4-4BCD-93E2-E3B085C9AB24}">
+                <p16:designElem xmlns:p16="http://schemas.microsoft.com/office/powerpoint/2015/main" val="1"/>
+              </p:ext>
+            </p:extLst>
+          </p:nvPr>
+        </p:nvCxnSpPr>
+        <p:spPr>
+          <a:xfrm flipH="1">
+            <a:off x="628650" y="3681408"/>
+            <a:ext cx="8515349" cy="0"/>
+          </a:xfrm>
+          <a:prstGeom prst="line">
+            <a:avLst/>
+          </a:prstGeom>
+          <a:ln w="12700">
+            <a:solidFill>
+              <a:schemeClr val="accent2"/>
+            </a:solidFill>
+          </a:ln>
+        </p:spPr>
+        <p:style>
+          <a:lnRef idx="1">
+            <a:schemeClr val="accent1"/>
+          </a:lnRef>
+          <a:fillRef idx="0">
+            <a:schemeClr val="accent1"/>
+          </a:fillRef>
+          <a:effectRef idx="0">
+            <a:schemeClr val="accent1"/>
+          </a:effectRef>
+          <a:fontRef idx="minor">
+            <a:schemeClr val="tx1"/>
+          </a:fontRef>
+        </p:style>
+      </p:cxnSp>
+      <p:sp>
+        <p:nvSpPr>
+          <p:cNvPr id="2" name="Slide Number Placeholder 1">
+            <a:extLst>
+              <a:ext uri="{FF2B5EF4-FFF2-40B4-BE49-F238E27FC236}">
+                <a16:creationId xmlns:a16="http://schemas.microsoft.com/office/drawing/2014/main" id="{60B4B432-1632-5577-F365-6AFE96447472}"/>
+              </a:ext>
+            </a:extLst>
+          </p:cNvPr>
+          <p:cNvSpPr>
+            <a:spLocks noGrp="1"/>
+          </p:cNvSpPr>
+          <p:nvPr>
+            <p:ph type="sldNum" sz="quarter" idx="12"/>
+          </p:nvPr>
+        </p:nvSpPr>
+        <p:spPr>
+          <a:xfrm>
+            <a:off x="6457950" y="6356350"/>
+            <a:ext cx="2057400" cy="365125"/>
+          </a:xfrm>
+        </p:spPr>
+        <p:txBody>
+          <a:bodyPr vert="horz" lIns="91440" tIns="45720" rIns="91440" bIns="45720" rtlCol="0" anchor="ctr">
+            <a:normAutofit/>
+          </a:bodyPr>
+          <a:lstStyle/>
+          <a:p>
+            <a:pPr>
+              <a:spcAft>
+                <a:spcPts val="600"/>
+              </a:spcAft>
+            </a:pPr>
+            <a:fld id="{621225AB-15B9-4C79-A121-04D1DC7E2307}" type="slidenum">
+              <a:rPr lang="en-US">
+                <a:solidFill>
+                  <a:srgbClr val="FFFFFF"/>
+                </a:solidFill>
+              </a:rPr>
+              <a:pPr>
+                <a:spcAft>
+                  <a:spcPts val="600"/>
+                </a:spcAft>
+              </a:pPr>
+              <a:t>4</a:t>
+            </a:fld>
+            <a:endParaRPr lang="en-US">
+              <a:solidFill>
+                <a:srgbClr val="FFFFFF"/>
+              </a:solidFill>
+            </a:endParaRPr>
+          </a:p>
+        </p:txBody>
+      </p:sp>
+      <p:pic>
+        <p:nvPicPr>
+          <p:cNvPr id="9" name="Picture 8" descr="A yellow text and a sword&#10;&#10;AI-generated content may be incorrect.">
+            <a:extLst>
+              <a:ext uri="{FF2B5EF4-FFF2-40B4-BE49-F238E27FC236}">
+                <a16:creationId xmlns:a16="http://schemas.microsoft.com/office/drawing/2014/main" id="{99D61262-3C55-E4F7-C4B1-1B5451C3CB19}"/>
+              </a:ext>
+            </a:extLst>
+          </p:cNvPr>
+          <p:cNvPicPr>
+            <a:picLocks noChangeAspect="1"/>
+          </p:cNvPicPr>
+          <p:nvPr/>
+        </p:nvPicPr>
+        <p:blipFill>
+          <a:blip r:embed="rId3">
+            <a:extLst>
+              <a:ext uri="{28A0092B-C50C-407E-A947-70E740481C1C}">
+                <a14:useLocalDpi xmlns:a14="http://schemas.microsoft.com/office/drawing/2010/main" val="0"/>
+              </a:ext>
+            </a:extLst>
+          </a:blip>
+          <a:stretch>
+            <a:fillRect/>
+          </a:stretch>
+        </p:blipFill>
+        <p:spPr>
+          <a:xfrm>
+            <a:off x="16914" y="1637895"/>
+            <a:ext cx="6002886" cy="1935141"/>
+          </a:xfrm>
+          <a:prstGeom prst="rect">
+            <a:avLst/>
+          </a:prstGeom>
+        </p:spPr>
+      </p:pic>
+    </p:spTree>
+    <p:extLst>
+      <p:ext uri="{BB962C8B-B14F-4D97-AF65-F5344CB8AC3E}">
+        <p14:creationId xmlns:p14="http://schemas.microsoft.com/office/powerpoint/2010/main" val="1166231196"/>
       </p:ext>
     </p:extLst>
   </p:cSld>
@@ -5207,7 +5683,7 @@
             </a:r>
             <a:r>
               <a:rPr lang="en-US" sz="1400" dirty="0"/>
-              <a:t> Thanks for technical assistance from Provo Divers</a:t>
+              <a:t> Thanks for technical assistance from Dive Exuma</a:t>
             </a:r>
           </a:p>
         </p:txBody>
@@ -5364,24 +5840,207 @@
         </p:blipFill>
         <p:spPr>
           <a:xfrm>
-            <a:off x="685799" y="3886200"/>
-            <a:ext cx="2304138" cy="2340000"/>
+            <a:off x="685799" y="3851341"/>
+            <a:ext cx="2590800" cy="2631124"/>
           </a:xfrm>
           <a:prstGeom prst="rect">
             <a:avLst/>
           </a:prstGeom>
         </p:spPr>
       </p:pic>
+      <p:sp>
+        <p:nvSpPr>
+          <p:cNvPr id="7" name="TextBox 6"/>
+          <p:cNvSpPr txBox="1"/>
+          <p:nvPr/>
+        </p:nvSpPr>
+        <p:spPr>
+          <a:xfrm>
+            <a:off x="533400" y="2514600"/>
+            <a:ext cx="7924800" cy="523220"/>
+          </a:xfrm>
+          <a:prstGeom prst="rect">
+            <a:avLst/>
+          </a:prstGeom>
+          <a:noFill/>
+        </p:spPr>
+        <p:txBody>
+          <a:bodyPr wrap="square" rtlCol="0">
+            <a:spAutoFit/>
+          </a:bodyPr>
+          <a:lstStyle/>
+          <a:p>
+            <a:r>
+              <a:rPr lang="en-CA" sz="2800" dirty="0"/>
+              <a:t>Design: Two-alternative forced-choice,  </a:t>
+            </a:r>
+            <a:r>
+              <a:rPr lang="en-CA" sz="2800" i="1" dirty="0"/>
+              <a:t>n</a:t>
+            </a:r>
+            <a:r>
+              <a:rPr lang="en-CA" sz="2800" dirty="0"/>
+              <a:t>=50 trials </a:t>
+            </a:r>
+          </a:p>
+        </p:txBody>
+      </p:sp>
+      <p:sp>
+        <p:nvSpPr>
+          <p:cNvPr id="8" name="TextBox 7"/>
+          <p:cNvSpPr txBox="1"/>
+          <p:nvPr/>
+        </p:nvSpPr>
+        <p:spPr>
+          <a:xfrm>
+            <a:off x="533400" y="3358516"/>
+            <a:ext cx="2590800" cy="461665"/>
+          </a:xfrm>
+          <a:prstGeom prst="rect">
+            <a:avLst/>
+          </a:prstGeom>
+          <a:noFill/>
+        </p:spPr>
+        <p:txBody>
+          <a:bodyPr wrap="square" rtlCol="0">
+            <a:spAutoFit/>
+          </a:bodyPr>
+          <a:lstStyle/>
+          <a:p>
+            <a:pPr algn="ctr"/>
+            <a:r>
+              <a:rPr lang="en-CA" sz="2400" dirty="0"/>
+              <a:t>Conch pie</a:t>
+            </a:r>
+          </a:p>
+        </p:txBody>
+      </p:sp>
+      <p:grpSp>
+        <p:nvGrpSpPr>
+          <p:cNvPr id="13" name="Group 12">
+            <a:extLst>
+              <a:ext uri="{FF2B5EF4-FFF2-40B4-BE49-F238E27FC236}">
+                <a16:creationId xmlns:a16="http://schemas.microsoft.com/office/drawing/2014/main" id="{B742D551-3EE1-1169-7298-22F6296618DC}"/>
+              </a:ext>
+            </a:extLst>
+          </p:cNvPr>
+          <p:cNvGrpSpPr/>
+          <p:nvPr/>
+        </p:nvGrpSpPr>
+        <p:grpSpPr>
+          <a:xfrm>
+            <a:off x="4677230" y="3393375"/>
+            <a:ext cx="2409370" cy="3129747"/>
+            <a:chOff x="4372430" y="3393375"/>
+            <a:chExt cx="2409370" cy="3129747"/>
+          </a:xfrm>
+        </p:grpSpPr>
+        <p:pic>
+          <p:nvPicPr>
+            <p:cNvPr id="6" name="Picture 5"/>
+            <p:cNvPicPr>
+              <a:picLocks noChangeAspect="1"/>
+            </p:cNvPicPr>
+            <p:nvPr/>
+          </p:nvPicPr>
+          <p:blipFill>
+            <a:blip r:embed="rId3">
+              <a:extLst>
+                <a:ext uri="{28A0092B-C50C-407E-A947-70E740481C1C}">
+                  <a14:useLocalDpi xmlns:a14="http://schemas.microsoft.com/office/drawing/2010/main" val="0"/>
+                </a:ext>
+              </a:extLst>
+            </a:blip>
+            <a:stretch>
+              <a:fillRect/>
+            </a:stretch>
+          </p:blipFill>
+          <p:spPr>
+            <a:xfrm>
+              <a:off x="4372430" y="3886200"/>
+              <a:ext cx="2409370" cy="2636922"/>
+            </a:xfrm>
+            <a:prstGeom prst="rect">
+              <a:avLst/>
+            </a:prstGeom>
+          </p:spPr>
+        </p:pic>
+        <p:sp>
+          <p:nvSpPr>
+            <p:cNvPr id="9" name="TextBox 8"/>
+            <p:cNvSpPr txBox="1"/>
+            <p:nvPr/>
+          </p:nvSpPr>
+          <p:spPr>
+            <a:xfrm>
+              <a:off x="4495800" y="3393375"/>
+              <a:ext cx="2138072" cy="461665"/>
+            </a:xfrm>
+            <a:prstGeom prst="rect">
+              <a:avLst/>
+            </a:prstGeom>
+            <a:noFill/>
+          </p:spPr>
+          <p:txBody>
+            <a:bodyPr wrap="square" rtlCol="0">
+              <a:spAutoFit/>
+            </a:bodyPr>
+            <a:lstStyle/>
+            <a:p>
+              <a:pPr algn="ctr"/>
+              <a:r>
+                <a:rPr lang="en-CA" sz="2400" dirty="0"/>
+                <a:t>Granola bar</a:t>
+              </a:r>
+            </a:p>
+          </p:txBody>
+        </p:sp>
+      </p:grpSp>
+      <p:sp>
+        <p:nvSpPr>
+          <p:cNvPr id="10" name="TextBox 9"/>
+          <p:cNvSpPr txBox="1"/>
+          <p:nvPr/>
+        </p:nvSpPr>
+        <p:spPr>
+          <a:xfrm>
+            <a:off x="7239000" y="3805781"/>
+            <a:ext cx="1781175" cy="1200329"/>
+          </a:xfrm>
+          <a:prstGeom prst="rect">
+            <a:avLst/>
+          </a:prstGeom>
+          <a:noFill/>
+        </p:spPr>
+        <p:txBody>
+          <a:bodyPr wrap="square" rtlCol="0">
+            <a:spAutoFit/>
+          </a:bodyPr>
+          <a:lstStyle/>
+          <a:p>
+            <a:r>
+              <a:rPr lang="en-CA" sz="2400" dirty="0"/>
+              <a:t>Sample stimulus items</a:t>
+            </a:r>
+          </a:p>
+        </p:txBody>
+      </p:sp>
       <p:pic>
         <p:nvPicPr>
-          <p:cNvPr id="6" name="Picture 5"/>
+          <p:cNvPr id="12" name="Picture 11" descr="A cartoon of a shark&#10;&#10;AI-generated content may be incorrect.">
+            <a:extLst>
+              <a:ext uri="{FF2B5EF4-FFF2-40B4-BE49-F238E27FC236}">
+                <a16:creationId xmlns:a16="http://schemas.microsoft.com/office/drawing/2014/main" id="{0B298585-048B-5156-2994-6AFFC1C77F77}"/>
+              </a:ext>
+            </a:extLst>
+          </p:cNvPr>
           <p:cNvPicPr>
             <a:picLocks noChangeAspect="1"/>
           </p:cNvPicPr>
           <p:nvPr/>
         </p:nvPicPr>
         <p:blipFill>
-          <a:blip r:embed="rId3">
+          <a:blip r:embed="rId4">
             <a:extLst>
               <a:ext uri="{28A0092B-C50C-407E-A947-70E740481C1C}">
                 <a14:useLocalDpi xmlns:a14="http://schemas.microsoft.com/office/drawing/2010/main" val="0"/>
@@ -5394,140 +6053,50 @@
         </p:blipFill>
         <p:spPr>
           <a:xfrm>
-            <a:off x="3809999" y="3886200"/>
-            <a:ext cx="2138071" cy="2340000"/>
+            <a:off x="3053305" y="2977065"/>
+            <a:ext cx="856480" cy="856480"/>
           </a:xfrm>
           <a:prstGeom prst="rect">
             <a:avLst/>
           </a:prstGeom>
         </p:spPr>
       </p:pic>
-      <p:sp>
-        <p:nvSpPr>
-          <p:cNvPr id="7" name="TextBox 6"/>
-          <p:cNvSpPr txBox="1"/>
+      <p:pic>
+        <p:nvPicPr>
+          <p:cNvPr id="17" name="Picture 16" descr="A cartoon shark with big eyes&#10;&#10;AI-generated content may be incorrect.">
+            <a:extLst>
+              <a:ext uri="{FF2B5EF4-FFF2-40B4-BE49-F238E27FC236}">
+                <a16:creationId xmlns:a16="http://schemas.microsoft.com/office/drawing/2014/main" id="{49A3FBDF-EF2D-6FA8-6B93-D485B36C8B21}"/>
+              </a:ext>
+            </a:extLst>
+          </p:cNvPr>
+          <p:cNvPicPr>
+            <a:picLocks noChangeAspect="1"/>
+          </p:cNvPicPr>
           <p:nvPr/>
-        </p:nvSpPr>
+        </p:nvPicPr>
+        <p:blipFill>
+          <a:blip r:embed="rId5" cstate="print">
+            <a:extLst>
+              <a:ext uri="{28A0092B-C50C-407E-A947-70E740481C1C}">
+                <a14:useLocalDpi xmlns:a14="http://schemas.microsoft.com/office/drawing/2010/main" val="0"/>
+              </a:ext>
+            </a:extLst>
+          </a:blip>
+          <a:stretch>
+            <a:fillRect/>
+          </a:stretch>
+        </p:blipFill>
         <p:spPr>
           <a:xfrm>
-            <a:off x="533400" y="2514600"/>
-            <a:ext cx="7924800" cy="523220"/>
+            <a:off x="3909785" y="2977065"/>
+            <a:ext cx="859536" cy="859536"/>
           </a:xfrm>
           <a:prstGeom prst="rect">
             <a:avLst/>
           </a:prstGeom>
-          <a:noFill/>
         </p:spPr>
-        <p:txBody>
-          <a:bodyPr wrap="square" rtlCol="0">
-            <a:spAutoFit/>
-          </a:bodyPr>
-          <a:lstStyle/>
-          <a:p>
-            <a:r>
-              <a:rPr lang="en-CA" sz="2800" dirty="0"/>
-              <a:t>Design: Two-alternative forced-choice,  </a:t>
-            </a:r>
-            <a:r>
-              <a:rPr lang="en-CA" sz="2800" i="1" dirty="0"/>
-              <a:t>n</a:t>
-            </a:r>
-            <a:r>
-              <a:rPr lang="en-CA" sz="2800" dirty="0"/>
-              <a:t>=50 trials </a:t>
-            </a:r>
-          </a:p>
-        </p:txBody>
-      </p:sp>
-      <p:sp>
-        <p:nvSpPr>
-          <p:cNvPr id="8" name="TextBox 7"/>
-          <p:cNvSpPr txBox="1"/>
-          <p:nvPr/>
-        </p:nvSpPr>
-        <p:spPr>
-          <a:xfrm>
-            <a:off x="533400" y="3393375"/>
-            <a:ext cx="2590800" cy="461665"/>
-          </a:xfrm>
-          <a:prstGeom prst="rect">
-            <a:avLst/>
-          </a:prstGeom>
-          <a:noFill/>
-        </p:spPr>
-        <p:txBody>
-          <a:bodyPr wrap="square" rtlCol="0">
-            <a:spAutoFit/>
-          </a:bodyPr>
-          <a:lstStyle/>
-          <a:p>
-            <a:pPr algn="ctr"/>
-            <a:r>
-              <a:rPr lang="en-CA" sz="2400" dirty="0"/>
-              <a:t>Conch pie</a:t>
-            </a:r>
-          </a:p>
-        </p:txBody>
-      </p:sp>
-      <p:sp>
-        <p:nvSpPr>
-          <p:cNvPr id="9" name="TextBox 8"/>
-          <p:cNvSpPr txBox="1"/>
-          <p:nvPr/>
-        </p:nvSpPr>
-        <p:spPr>
-          <a:xfrm>
-            <a:off x="3809999" y="3393375"/>
-            <a:ext cx="2138072" cy="461665"/>
-          </a:xfrm>
-          <a:prstGeom prst="rect">
-            <a:avLst/>
-          </a:prstGeom>
-          <a:noFill/>
-        </p:spPr>
-        <p:txBody>
-          <a:bodyPr wrap="square" rtlCol="0">
-            <a:spAutoFit/>
-          </a:bodyPr>
-          <a:lstStyle/>
-          <a:p>
-            <a:pPr algn="ctr"/>
-            <a:r>
-              <a:rPr lang="en-CA" sz="2400" dirty="0"/>
-              <a:t>Granola bar</a:t>
-            </a:r>
-          </a:p>
-        </p:txBody>
-      </p:sp>
-      <p:sp>
-        <p:nvSpPr>
-          <p:cNvPr id="10" name="TextBox 9"/>
-          <p:cNvSpPr txBox="1"/>
-          <p:nvPr/>
-        </p:nvSpPr>
-        <p:spPr>
-          <a:xfrm>
-            <a:off x="6400800" y="3886200"/>
-            <a:ext cx="2238375" cy="830997"/>
-          </a:xfrm>
-          <a:prstGeom prst="rect">
-            <a:avLst/>
-          </a:prstGeom>
-          <a:noFill/>
-        </p:spPr>
-        <p:txBody>
-          <a:bodyPr wrap="square" rtlCol="0">
-            <a:spAutoFit/>
-          </a:bodyPr>
-          <a:lstStyle/>
-          <a:p>
-            <a:r>
-              <a:rPr lang="en-CA" sz="2400" dirty="0"/>
-              <a:t>Sample stimulus items</a:t>
-            </a:r>
-          </a:p>
-        </p:txBody>
-      </p:sp>
+      </p:pic>
     </p:spTree>
     <p:extLst>
       <p:ext uri="{BB962C8B-B14F-4D97-AF65-F5344CB8AC3E}">

</xml_diff>